<commit_message>
Update 21 - Analise do Ciclo de Vida.pptx
</commit_message>
<xml_diff>
--- a/21 - Analise do Ciclo de Vida.pptx
+++ b/21 - Analise do Ciclo de Vida.pptx
@@ -5,7 +5,7 @@
     <p:sldMasterId id="2147483648" r:id="rId1"/>
   </p:sldMasterIdLst>
   <p:sldIdLst>
-    <p:sldId id="256" r:id="rId3"/>
+    <p:sldId id="257" r:id="rId2"/>
   </p:sldIdLst>
   <p:sldSz cx="12192000" cy="6858000"/>
   <p:notesSz cx="6858000" cy="9144000"/>
@@ -104,7 +104,72 @@
       </a:defRPr>
     </a:lvl9pPr>
   </p:defaultTextStyle>
+  <p:extLst>
+    <p:ext uri="{EFAFB233-063F-42B5-8137-9DF3F51BA10A}">
+      <p15:sldGuideLst xmlns:p15="http://schemas.microsoft.com/office/powerpoint/2012/main"/>
+    </p:ext>
+  </p:extLst>
 </p:presentation>
+</file>
+
+<file path=ppt/changesInfos/changesInfo1.xml><?xml version="1.0" encoding="utf-8"?>
+<pc:chgInfo xmlns:a="http://schemas.openxmlformats.org/drawingml/2006/main" xmlns:r="http://schemas.openxmlformats.org/officeDocument/2006/relationships" xmlns:ac="http://schemas.microsoft.com/office/drawing/2013/main/command" xmlns:pc="http://schemas.microsoft.com/office/powerpoint/2013/main/command">
+  <pc:docChgLst>
+    <pc:chgData name="Pedro Botter Bondezan" userId="9a65a1c4a761de2f" providerId="LiveId" clId="{E6EF8DE4-D8F3-4862-9ECB-B61809513B9E}"/>
+    <pc:docChg chg="undo custSel addSld delSld modSld">
+      <pc:chgData name="Pedro Botter Bondezan" userId="9a65a1c4a761de2f" providerId="LiveId" clId="{E6EF8DE4-D8F3-4862-9ECB-B61809513B9E}" dt="2020-10-25T21:30:31.084" v="10" actId="47"/>
+      <pc:docMkLst>
+        <pc:docMk/>
+      </pc:docMkLst>
+      <pc:sldChg chg="addSp delSp del mod">
+        <pc:chgData name="Pedro Botter Bondezan" userId="9a65a1c4a761de2f" providerId="LiveId" clId="{E6EF8DE4-D8F3-4862-9ECB-B61809513B9E}" dt="2020-10-25T21:30:31.084" v="10" actId="47"/>
+        <pc:sldMkLst>
+          <pc:docMk/>
+          <pc:sldMk cId="0" sldId="256"/>
+        </pc:sldMkLst>
+        <pc:picChg chg="add del">
+          <ac:chgData name="Pedro Botter Bondezan" userId="9a65a1c4a761de2f" providerId="LiveId" clId="{E6EF8DE4-D8F3-4862-9ECB-B61809513B9E}" dt="2020-10-25T21:30:03.793" v="9" actId="478"/>
+          <ac:picMkLst>
+            <pc:docMk/>
+            <pc:sldMk cId="0" sldId="256"/>
+            <ac:picMk id="6" creationId="{00000000-0000-0000-0000-000000000000}"/>
+          </ac:picMkLst>
+        </pc:picChg>
+      </pc:sldChg>
+      <pc:sldChg chg="addSp delSp modSp new mod">
+        <pc:chgData name="Pedro Botter Bondezan" userId="9a65a1c4a761de2f" providerId="LiveId" clId="{E6EF8DE4-D8F3-4862-9ECB-B61809513B9E}" dt="2020-10-25T21:29:58.120" v="7" actId="14100"/>
+        <pc:sldMkLst>
+          <pc:docMk/>
+          <pc:sldMk cId="2323937444" sldId="257"/>
+        </pc:sldMkLst>
+        <pc:spChg chg="del">
+          <ac:chgData name="Pedro Botter Bondezan" userId="9a65a1c4a761de2f" providerId="LiveId" clId="{E6EF8DE4-D8F3-4862-9ECB-B61809513B9E}" dt="2020-10-25T21:29:38.211" v="1" actId="478"/>
+          <ac:spMkLst>
+            <pc:docMk/>
+            <pc:sldMk cId="2323937444" sldId="257"/>
+            <ac:spMk id="2" creationId="{DD0EAE34-A6F7-4F08-AF07-76219D3DCDFC}"/>
+          </ac:spMkLst>
+        </pc:spChg>
+        <pc:spChg chg="del">
+          <ac:chgData name="Pedro Botter Bondezan" userId="9a65a1c4a761de2f" providerId="LiveId" clId="{E6EF8DE4-D8F3-4862-9ECB-B61809513B9E}" dt="2020-10-25T21:29:40.191" v="2" actId="478"/>
+          <ac:spMkLst>
+            <pc:docMk/>
+            <pc:sldMk cId="2323937444" sldId="257"/>
+            <ac:spMk id="3" creationId="{F29EA0B4-EA52-439A-A491-F173D2472831}"/>
+          </ac:spMkLst>
+        </pc:spChg>
+        <pc:picChg chg="add mod">
+          <ac:chgData name="Pedro Botter Bondezan" userId="9a65a1c4a761de2f" providerId="LiveId" clId="{E6EF8DE4-D8F3-4862-9ECB-B61809513B9E}" dt="2020-10-25T21:29:58.120" v="7" actId="14100"/>
+          <ac:picMkLst>
+            <pc:docMk/>
+            <pc:sldMk cId="2323937444" sldId="257"/>
+            <ac:picMk id="5" creationId="{C4C1D783-AF30-4A7B-B676-430D5A0ADD63}"/>
+          </ac:picMkLst>
+        </pc:picChg>
+      </pc:sldChg>
+    </pc:docChg>
+  </pc:docChgLst>
+</pc:chgInfo>
 </file>
 
 <file path=ppt/slideLayouts/slideLayout1.xml><?xml version="1.0" encoding="utf-8"?>
@@ -149,10 +214,9 @@
           </a:lstStyle>
           <a:p>
             <a:r>
-              <a:rPr lang="en-US" smtClean="0"/>
+              <a:rPr lang="en-US"/>
               <a:t>Click to edit Master title style</a:t>
             </a:r>
-            <a:endParaRPr lang="en-US"/>
           </a:p>
         </p:txBody>
       </p:sp>
@@ -214,10 +278,9 @@
           </a:lstStyle>
           <a:p>
             <a:r>
-              <a:rPr lang="en-US" smtClean="0"/>
+              <a:rPr lang="en-US"/>
               <a:t>Click to edit Master subtitle style</a:t>
             </a:r>
-            <a:endParaRPr lang="en-US"/>
           </a:p>
         </p:txBody>
       </p:sp>
@@ -238,6 +301,7 @@
           <a:p>
             <a:fld id="{63A1C593-65D0-4073-BCC9-577B9352EA97}" type="datetimeFigureOut">
               <a:rPr lang="en-US" smtClean="0"/>
+              <a:t>10/25/2020</a:t>
             </a:fld>
             <a:endParaRPr lang="en-US"/>
           </a:p>
@@ -279,6 +343,7 @@
           <a:p>
             <a:fld id="{9B618960-8005-486C-9A75-10CB2AAC16F9}" type="slidenum">
               <a:rPr lang="en-US" smtClean="0"/>
+              <a:t>‹nº›</a:t>
             </a:fld>
             <a:endParaRPr lang="en-US"/>
           </a:p>
@@ -325,10 +390,9 @@
           <a:lstStyle/>
           <a:p>
             <a:r>
-              <a:rPr lang="en-US" smtClean="0"/>
+              <a:rPr lang="en-US"/>
               <a:t>Click to edit Master title style</a:t>
             </a:r>
-            <a:endParaRPr lang="en-US"/>
           </a:p>
         </p:txBody>
       </p:sp>
@@ -349,42 +413,37 @@
           <a:p>
             <a:pPr lvl="0"/>
             <a:r>
-              <a:rPr lang="en-US" smtClean="0"/>
+              <a:rPr lang="en-US"/>
               <a:t>Click to edit Master text styles</a:t>
             </a:r>
-            <a:endParaRPr lang="en-US" smtClean="0"/>
           </a:p>
           <a:p>
             <a:pPr lvl="1"/>
             <a:r>
-              <a:rPr lang="en-US" smtClean="0"/>
+              <a:rPr lang="en-US"/>
               <a:t>Second level</a:t>
             </a:r>
-            <a:endParaRPr lang="en-US" smtClean="0"/>
           </a:p>
           <a:p>
             <a:pPr lvl="2"/>
             <a:r>
-              <a:rPr lang="en-US" smtClean="0"/>
+              <a:rPr lang="en-US"/>
               <a:t>Third level</a:t>
             </a:r>
-            <a:endParaRPr lang="en-US" smtClean="0"/>
           </a:p>
           <a:p>
             <a:pPr lvl="3"/>
             <a:r>
-              <a:rPr lang="en-US" smtClean="0"/>
+              <a:rPr lang="en-US"/>
               <a:t>Fourth level</a:t>
             </a:r>
-            <a:endParaRPr lang="en-US" smtClean="0"/>
           </a:p>
           <a:p>
             <a:pPr lvl="4"/>
             <a:r>
-              <a:rPr lang="en-US" smtClean="0"/>
+              <a:rPr lang="en-US"/>
               <a:t>Fifth level</a:t>
             </a:r>
-            <a:endParaRPr lang="en-US"/>
           </a:p>
         </p:txBody>
       </p:sp>
@@ -405,6 +464,7 @@
           <a:p>
             <a:fld id="{63A1C593-65D0-4073-BCC9-577B9352EA97}" type="datetimeFigureOut">
               <a:rPr lang="en-US" smtClean="0"/>
+              <a:t>10/25/2020</a:t>
             </a:fld>
             <a:endParaRPr lang="en-US"/>
           </a:p>
@@ -446,6 +506,7 @@
           <a:p>
             <a:fld id="{9B618960-8005-486C-9A75-10CB2AAC16F9}" type="slidenum">
               <a:rPr lang="en-US" smtClean="0"/>
+              <a:t>‹nº›</a:t>
             </a:fld>
             <a:endParaRPr lang="en-US"/>
           </a:p>
@@ -497,10 +558,9 @@
           <a:lstStyle/>
           <a:p>
             <a:r>
-              <a:rPr lang="en-US" smtClean="0"/>
+              <a:rPr lang="en-US"/>
               <a:t>Click to edit Master title style</a:t>
             </a:r>
-            <a:endParaRPr lang="en-US"/>
           </a:p>
         </p:txBody>
       </p:sp>
@@ -526,42 +586,37 @@
           <a:p>
             <a:pPr lvl="0"/>
             <a:r>
-              <a:rPr lang="en-US" smtClean="0"/>
+              <a:rPr lang="en-US"/>
               <a:t>Click to edit Master text styles</a:t>
             </a:r>
-            <a:endParaRPr lang="en-US" smtClean="0"/>
           </a:p>
           <a:p>
             <a:pPr lvl="1"/>
             <a:r>
-              <a:rPr lang="en-US" smtClean="0"/>
+              <a:rPr lang="en-US"/>
               <a:t>Second level</a:t>
             </a:r>
-            <a:endParaRPr lang="en-US" smtClean="0"/>
           </a:p>
           <a:p>
             <a:pPr lvl="2"/>
             <a:r>
-              <a:rPr lang="en-US" smtClean="0"/>
+              <a:rPr lang="en-US"/>
               <a:t>Third level</a:t>
             </a:r>
-            <a:endParaRPr lang="en-US" smtClean="0"/>
           </a:p>
           <a:p>
             <a:pPr lvl="3"/>
             <a:r>
-              <a:rPr lang="en-US" smtClean="0"/>
+              <a:rPr lang="en-US"/>
               <a:t>Fourth level</a:t>
             </a:r>
-            <a:endParaRPr lang="en-US" smtClean="0"/>
           </a:p>
           <a:p>
             <a:pPr lvl="4"/>
             <a:r>
-              <a:rPr lang="en-US" smtClean="0"/>
+              <a:rPr lang="en-US"/>
               <a:t>Fifth level</a:t>
             </a:r>
-            <a:endParaRPr lang="en-US"/>
           </a:p>
         </p:txBody>
       </p:sp>
@@ -582,6 +637,7 @@
           <a:p>
             <a:fld id="{63A1C593-65D0-4073-BCC9-577B9352EA97}" type="datetimeFigureOut">
               <a:rPr lang="en-US" smtClean="0"/>
+              <a:t>10/25/2020</a:t>
             </a:fld>
             <a:endParaRPr lang="en-US"/>
           </a:p>
@@ -623,6 +679,7 @@
           <a:p>
             <a:fld id="{9B618960-8005-486C-9A75-10CB2AAC16F9}" type="slidenum">
               <a:rPr lang="en-US" smtClean="0"/>
+              <a:t>‹nº›</a:t>
             </a:fld>
             <a:endParaRPr lang="en-US"/>
           </a:p>
@@ -669,10 +726,9 @@
           <a:lstStyle/>
           <a:p>
             <a:r>
-              <a:rPr lang="en-US" smtClean="0"/>
+              <a:rPr lang="en-US"/>
               <a:t>Click to edit Master title style</a:t>
             </a:r>
-            <a:endParaRPr lang="en-US"/>
           </a:p>
         </p:txBody>
       </p:sp>
@@ -693,42 +749,37 @@
           <a:p>
             <a:pPr lvl="0"/>
             <a:r>
-              <a:rPr lang="en-US" smtClean="0"/>
+              <a:rPr lang="en-US"/>
               <a:t>Click to edit Master text styles</a:t>
             </a:r>
-            <a:endParaRPr lang="en-US" smtClean="0"/>
           </a:p>
           <a:p>
             <a:pPr lvl="1"/>
             <a:r>
-              <a:rPr lang="en-US" smtClean="0"/>
+              <a:rPr lang="en-US"/>
               <a:t>Second level</a:t>
             </a:r>
-            <a:endParaRPr lang="en-US" smtClean="0"/>
           </a:p>
           <a:p>
             <a:pPr lvl="2"/>
             <a:r>
-              <a:rPr lang="en-US" smtClean="0"/>
+              <a:rPr lang="en-US"/>
               <a:t>Third level</a:t>
             </a:r>
-            <a:endParaRPr lang="en-US" smtClean="0"/>
           </a:p>
           <a:p>
             <a:pPr lvl="3"/>
             <a:r>
-              <a:rPr lang="en-US" smtClean="0"/>
+              <a:rPr lang="en-US"/>
               <a:t>Fourth level</a:t>
             </a:r>
-            <a:endParaRPr lang="en-US" smtClean="0"/>
           </a:p>
           <a:p>
             <a:pPr lvl="4"/>
             <a:r>
-              <a:rPr lang="en-US" smtClean="0"/>
+              <a:rPr lang="en-US"/>
               <a:t>Fifth level</a:t>
             </a:r>
-            <a:endParaRPr lang="en-US"/>
           </a:p>
         </p:txBody>
       </p:sp>
@@ -749,6 +800,7 @@
           <a:p>
             <a:fld id="{63A1C593-65D0-4073-BCC9-577B9352EA97}" type="datetimeFigureOut">
               <a:rPr lang="en-US" smtClean="0"/>
+              <a:t>10/25/2020</a:t>
             </a:fld>
             <a:endParaRPr lang="en-US"/>
           </a:p>
@@ -790,6 +842,7 @@
           <a:p>
             <a:fld id="{9B618960-8005-486C-9A75-10CB2AAC16F9}" type="slidenum">
               <a:rPr lang="en-US" smtClean="0"/>
+              <a:t>‹nº›</a:t>
             </a:fld>
             <a:endParaRPr lang="en-US"/>
           </a:p>
@@ -845,10 +898,9 @@
           </a:lstStyle>
           <a:p>
             <a:r>
-              <a:rPr lang="en-US" smtClean="0"/>
+              <a:rPr lang="en-US"/>
               <a:t>Click to edit Master title style</a:t>
             </a:r>
-            <a:endParaRPr lang="en-US"/>
           </a:p>
         </p:txBody>
       </p:sp>
@@ -965,10 +1017,9 @@
           <a:p>
             <a:pPr lvl="0"/>
             <a:r>
-              <a:rPr lang="en-US" smtClean="0"/>
+              <a:rPr lang="en-US"/>
               <a:t>Click to edit Master text styles</a:t>
             </a:r>
-            <a:endParaRPr lang="en-US" smtClean="0"/>
           </a:p>
         </p:txBody>
       </p:sp>
@@ -989,6 +1040,7 @@
           <a:p>
             <a:fld id="{63A1C593-65D0-4073-BCC9-577B9352EA97}" type="datetimeFigureOut">
               <a:rPr lang="en-US" smtClean="0"/>
+              <a:t>10/25/2020</a:t>
             </a:fld>
             <a:endParaRPr lang="en-US"/>
           </a:p>
@@ -1030,6 +1082,7 @@
           <a:p>
             <a:fld id="{9B618960-8005-486C-9A75-10CB2AAC16F9}" type="slidenum">
               <a:rPr lang="en-US" smtClean="0"/>
+              <a:t>‹nº›</a:t>
             </a:fld>
             <a:endParaRPr lang="en-US"/>
           </a:p>
@@ -1076,10 +1129,9 @@
           <a:lstStyle/>
           <a:p>
             <a:r>
-              <a:rPr lang="en-US" smtClean="0"/>
+              <a:rPr lang="en-US"/>
               <a:t>Click to edit Master title style</a:t>
             </a:r>
-            <a:endParaRPr lang="en-US"/>
           </a:p>
         </p:txBody>
       </p:sp>
@@ -1105,42 +1157,37 @@
           <a:p>
             <a:pPr lvl="0"/>
             <a:r>
-              <a:rPr lang="en-US" smtClean="0"/>
+              <a:rPr lang="en-US"/>
               <a:t>Click to edit Master text styles</a:t>
             </a:r>
-            <a:endParaRPr lang="en-US" smtClean="0"/>
           </a:p>
           <a:p>
             <a:pPr lvl="1"/>
             <a:r>
-              <a:rPr lang="en-US" smtClean="0"/>
+              <a:rPr lang="en-US"/>
               <a:t>Second level</a:t>
             </a:r>
-            <a:endParaRPr lang="en-US" smtClean="0"/>
           </a:p>
           <a:p>
             <a:pPr lvl="2"/>
             <a:r>
-              <a:rPr lang="en-US" smtClean="0"/>
+              <a:rPr lang="en-US"/>
               <a:t>Third level</a:t>
             </a:r>
-            <a:endParaRPr lang="en-US" smtClean="0"/>
           </a:p>
           <a:p>
             <a:pPr lvl="3"/>
             <a:r>
-              <a:rPr lang="en-US" smtClean="0"/>
+              <a:rPr lang="en-US"/>
               <a:t>Fourth level</a:t>
             </a:r>
-            <a:endParaRPr lang="en-US" smtClean="0"/>
           </a:p>
           <a:p>
             <a:pPr lvl="4"/>
             <a:r>
-              <a:rPr lang="en-US" smtClean="0"/>
+              <a:rPr lang="en-US"/>
               <a:t>Fifth level</a:t>
             </a:r>
-            <a:endParaRPr lang="en-US"/>
           </a:p>
         </p:txBody>
       </p:sp>
@@ -1166,42 +1213,37 @@
           <a:p>
             <a:pPr lvl="0"/>
             <a:r>
-              <a:rPr lang="en-US" smtClean="0"/>
+              <a:rPr lang="en-US"/>
               <a:t>Click to edit Master text styles</a:t>
             </a:r>
-            <a:endParaRPr lang="en-US" smtClean="0"/>
           </a:p>
           <a:p>
             <a:pPr lvl="1"/>
             <a:r>
-              <a:rPr lang="en-US" smtClean="0"/>
+              <a:rPr lang="en-US"/>
               <a:t>Second level</a:t>
             </a:r>
-            <a:endParaRPr lang="en-US" smtClean="0"/>
           </a:p>
           <a:p>
             <a:pPr lvl="2"/>
             <a:r>
-              <a:rPr lang="en-US" smtClean="0"/>
+              <a:rPr lang="en-US"/>
               <a:t>Third level</a:t>
             </a:r>
-            <a:endParaRPr lang="en-US" smtClean="0"/>
           </a:p>
           <a:p>
             <a:pPr lvl="3"/>
             <a:r>
-              <a:rPr lang="en-US" smtClean="0"/>
+              <a:rPr lang="en-US"/>
               <a:t>Fourth level</a:t>
             </a:r>
-            <a:endParaRPr lang="en-US" smtClean="0"/>
           </a:p>
           <a:p>
             <a:pPr lvl="4"/>
             <a:r>
-              <a:rPr lang="en-US" smtClean="0"/>
+              <a:rPr lang="en-US"/>
               <a:t>Fifth level</a:t>
             </a:r>
-            <a:endParaRPr lang="en-US"/>
           </a:p>
         </p:txBody>
       </p:sp>
@@ -1222,6 +1264,7 @@
           <a:p>
             <a:fld id="{63A1C593-65D0-4073-BCC9-577B9352EA97}" type="datetimeFigureOut">
               <a:rPr lang="en-US" smtClean="0"/>
+              <a:t>10/25/2020</a:t>
             </a:fld>
             <a:endParaRPr lang="en-US"/>
           </a:p>
@@ -1263,6 +1306,7 @@
           <a:p>
             <a:fld id="{9B618960-8005-486C-9A75-10CB2AAC16F9}" type="slidenum">
               <a:rPr lang="en-US" smtClean="0"/>
+              <a:t>‹nº›</a:t>
             </a:fld>
             <a:endParaRPr lang="en-US"/>
           </a:p>
@@ -1314,10 +1358,9 @@
           <a:lstStyle/>
           <a:p>
             <a:r>
-              <a:rPr lang="en-US" smtClean="0"/>
+              <a:rPr lang="en-US"/>
               <a:t>Click to edit Master title style</a:t>
             </a:r>
-            <a:endParaRPr lang="en-US"/>
           </a:p>
         </p:txBody>
       </p:sp>
@@ -1380,10 +1423,9 @@
           <a:p>
             <a:pPr lvl="0"/>
             <a:r>
-              <a:rPr lang="en-US" smtClean="0"/>
+              <a:rPr lang="en-US"/>
               <a:t>Click to edit Master text styles</a:t>
             </a:r>
-            <a:endParaRPr lang="en-US" smtClean="0"/>
           </a:p>
         </p:txBody>
       </p:sp>
@@ -1409,42 +1451,37 @@
           <a:p>
             <a:pPr lvl="0"/>
             <a:r>
-              <a:rPr lang="en-US" smtClean="0"/>
+              <a:rPr lang="en-US"/>
               <a:t>Click to edit Master text styles</a:t>
             </a:r>
-            <a:endParaRPr lang="en-US" smtClean="0"/>
           </a:p>
           <a:p>
             <a:pPr lvl="1"/>
             <a:r>
-              <a:rPr lang="en-US" smtClean="0"/>
+              <a:rPr lang="en-US"/>
               <a:t>Second level</a:t>
             </a:r>
-            <a:endParaRPr lang="en-US" smtClean="0"/>
           </a:p>
           <a:p>
             <a:pPr lvl="2"/>
             <a:r>
-              <a:rPr lang="en-US" smtClean="0"/>
+              <a:rPr lang="en-US"/>
               <a:t>Third level</a:t>
             </a:r>
-            <a:endParaRPr lang="en-US" smtClean="0"/>
           </a:p>
           <a:p>
             <a:pPr lvl="3"/>
             <a:r>
-              <a:rPr lang="en-US" smtClean="0"/>
+              <a:rPr lang="en-US"/>
               <a:t>Fourth level</a:t>
             </a:r>
-            <a:endParaRPr lang="en-US" smtClean="0"/>
           </a:p>
           <a:p>
             <a:pPr lvl="4"/>
             <a:r>
-              <a:rPr lang="en-US" smtClean="0"/>
+              <a:rPr lang="en-US"/>
               <a:t>Fifth level</a:t>
             </a:r>
-            <a:endParaRPr lang="en-US"/>
           </a:p>
         </p:txBody>
       </p:sp>
@@ -1507,10 +1544,9 @@
           <a:p>
             <a:pPr lvl="0"/>
             <a:r>
-              <a:rPr lang="en-US" smtClean="0"/>
+              <a:rPr lang="en-US"/>
               <a:t>Click to edit Master text styles</a:t>
             </a:r>
-            <a:endParaRPr lang="en-US" smtClean="0"/>
           </a:p>
         </p:txBody>
       </p:sp>
@@ -1536,42 +1572,37 @@
           <a:p>
             <a:pPr lvl="0"/>
             <a:r>
-              <a:rPr lang="en-US" smtClean="0"/>
+              <a:rPr lang="en-US"/>
               <a:t>Click to edit Master text styles</a:t>
             </a:r>
-            <a:endParaRPr lang="en-US" smtClean="0"/>
           </a:p>
           <a:p>
             <a:pPr lvl="1"/>
             <a:r>
-              <a:rPr lang="en-US" smtClean="0"/>
+              <a:rPr lang="en-US"/>
               <a:t>Second level</a:t>
             </a:r>
-            <a:endParaRPr lang="en-US" smtClean="0"/>
           </a:p>
           <a:p>
             <a:pPr lvl="2"/>
             <a:r>
-              <a:rPr lang="en-US" smtClean="0"/>
+              <a:rPr lang="en-US"/>
               <a:t>Third level</a:t>
             </a:r>
-            <a:endParaRPr lang="en-US" smtClean="0"/>
           </a:p>
           <a:p>
             <a:pPr lvl="3"/>
             <a:r>
-              <a:rPr lang="en-US" smtClean="0"/>
+              <a:rPr lang="en-US"/>
               <a:t>Fourth level</a:t>
             </a:r>
-            <a:endParaRPr lang="en-US" smtClean="0"/>
           </a:p>
           <a:p>
             <a:pPr lvl="4"/>
             <a:r>
-              <a:rPr lang="en-US" smtClean="0"/>
+              <a:rPr lang="en-US"/>
               <a:t>Fifth level</a:t>
             </a:r>
-            <a:endParaRPr lang="en-US"/>
           </a:p>
         </p:txBody>
       </p:sp>
@@ -1592,6 +1623,7 @@
           <a:p>
             <a:fld id="{63A1C593-65D0-4073-BCC9-577B9352EA97}" type="datetimeFigureOut">
               <a:rPr lang="en-US" smtClean="0"/>
+              <a:t>10/25/2020</a:t>
             </a:fld>
             <a:endParaRPr lang="en-US"/>
           </a:p>
@@ -1633,6 +1665,7 @@
           <a:p>
             <a:fld id="{9B618960-8005-486C-9A75-10CB2AAC16F9}" type="slidenum">
               <a:rPr lang="en-US" smtClean="0"/>
+              <a:t>‹nº›</a:t>
             </a:fld>
             <a:endParaRPr lang="en-US"/>
           </a:p>
@@ -1679,10 +1712,9 @@
           <a:lstStyle/>
           <a:p>
             <a:r>
-              <a:rPr lang="en-US" smtClean="0"/>
+              <a:rPr lang="en-US"/>
               <a:t>Click to edit Master title style</a:t>
             </a:r>
-            <a:endParaRPr lang="en-US"/>
           </a:p>
         </p:txBody>
       </p:sp>
@@ -1703,6 +1735,7 @@
           <a:p>
             <a:fld id="{63A1C593-65D0-4073-BCC9-577B9352EA97}" type="datetimeFigureOut">
               <a:rPr lang="en-US" smtClean="0"/>
+              <a:t>10/25/2020</a:t>
             </a:fld>
             <a:endParaRPr lang="en-US"/>
           </a:p>
@@ -1744,6 +1777,7 @@
           <a:p>
             <a:fld id="{9B618960-8005-486C-9A75-10CB2AAC16F9}" type="slidenum">
               <a:rPr lang="en-US" smtClean="0"/>
+              <a:t>‹nº›</a:t>
             </a:fld>
             <a:endParaRPr lang="en-US"/>
           </a:p>
@@ -1791,6 +1825,7 @@
           <a:p>
             <a:fld id="{63A1C593-65D0-4073-BCC9-577B9352EA97}" type="datetimeFigureOut">
               <a:rPr lang="en-US" smtClean="0"/>
+              <a:t>10/25/2020</a:t>
             </a:fld>
             <a:endParaRPr lang="en-US"/>
           </a:p>
@@ -1832,6 +1867,7 @@
           <a:p>
             <a:fld id="{9B618960-8005-486C-9A75-10CB2AAC16F9}" type="slidenum">
               <a:rPr lang="en-US" smtClean="0"/>
+              <a:t>‹nº›</a:t>
             </a:fld>
             <a:endParaRPr lang="en-US"/>
           </a:p>
@@ -1887,10 +1923,9 @@
           </a:lstStyle>
           <a:p>
             <a:r>
-              <a:rPr lang="en-US" smtClean="0"/>
+              <a:rPr lang="en-US"/>
               <a:t>Click to edit Master title style</a:t>
             </a:r>
-            <a:endParaRPr lang="en-US"/>
           </a:p>
         </p:txBody>
       </p:sp>
@@ -1944,42 +1979,37 @@
           <a:p>
             <a:pPr lvl="0"/>
             <a:r>
-              <a:rPr lang="en-US" smtClean="0"/>
+              <a:rPr lang="en-US"/>
               <a:t>Click to edit Master text styles</a:t>
             </a:r>
-            <a:endParaRPr lang="en-US" smtClean="0"/>
           </a:p>
           <a:p>
             <a:pPr lvl="1"/>
             <a:r>
-              <a:rPr lang="en-US" smtClean="0"/>
+              <a:rPr lang="en-US"/>
               <a:t>Second level</a:t>
             </a:r>
-            <a:endParaRPr lang="en-US" smtClean="0"/>
           </a:p>
           <a:p>
             <a:pPr lvl="2"/>
             <a:r>
-              <a:rPr lang="en-US" smtClean="0"/>
+              <a:rPr lang="en-US"/>
               <a:t>Third level</a:t>
             </a:r>
-            <a:endParaRPr lang="en-US" smtClean="0"/>
           </a:p>
           <a:p>
             <a:pPr lvl="3"/>
             <a:r>
-              <a:rPr lang="en-US" smtClean="0"/>
+              <a:rPr lang="en-US"/>
               <a:t>Fourth level</a:t>
             </a:r>
-            <a:endParaRPr lang="en-US" smtClean="0"/>
           </a:p>
           <a:p>
             <a:pPr lvl="4"/>
             <a:r>
-              <a:rPr lang="en-US" smtClean="0"/>
+              <a:rPr lang="en-US"/>
               <a:t>Fifth level</a:t>
             </a:r>
-            <a:endParaRPr lang="en-US"/>
           </a:p>
         </p:txBody>
       </p:sp>
@@ -2042,10 +2072,9 @@
           <a:p>
             <a:pPr lvl="0"/>
             <a:r>
-              <a:rPr lang="en-US" smtClean="0"/>
+              <a:rPr lang="en-US"/>
               <a:t>Click to edit Master text styles</a:t>
             </a:r>
-            <a:endParaRPr lang="en-US" smtClean="0"/>
           </a:p>
         </p:txBody>
       </p:sp>
@@ -2066,6 +2095,7 @@
           <a:p>
             <a:fld id="{63A1C593-65D0-4073-BCC9-577B9352EA97}" type="datetimeFigureOut">
               <a:rPr lang="en-US" smtClean="0"/>
+              <a:t>10/25/2020</a:t>
             </a:fld>
             <a:endParaRPr lang="en-US"/>
           </a:p>
@@ -2107,6 +2137,7 @@
           <a:p>
             <a:fld id="{9B618960-8005-486C-9A75-10CB2AAC16F9}" type="slidenum">
               <a:rPr lang="en-US" smtClean="0"/>
+              <a:t>‹nº›</a:t>
             </a:fld>
             <a:endParaRPr lang="en-US"/>
           </a:p>
@@ -2162,10 +2193,9 @@
           </a:lstStyle>
           <a:p>
             <a:r>
-              <a:rPr lang="en-US" smtClean="0"/>
+              <a:rPr lang="en-US"/>
               <a:t>Click to edit Master title style</a:t>
             </a:r>
-            <a:endParaRPr lang="en-US"/>
           </a:p>
         </p:txBody>
       </p:sp>
@@ -2289,10 +2319,9 @@
           <a:p>
             <a:pPr lvl="0"/>
             <a:r>
-              <a:rPr lang="en-US" smtClean="0"/>
+              <a:rPr lang="en-US"/>
               <a:t>Click to edit Master text styles</a:t>
             </a:r>
-            <a:endParaRPr lang="en-US" smtClean="0"/>
           </a:p>
         </p:txBody>
       </p:sp>
@@ -2313,6 +2342,7 @@
           <a:p>
             <a:fld id="{63A1C593-65D0-4073-BCC9-577B9352EA97}" type="datetimeFigureOut">
               <a:rPr lang="en-US" smtClean="0"/>
+              <a:t>10/25/2020</a:t>
             </a:fld>
             <a:endParaRPr lang="en-US"/>
           </a:p>
@@ -2354,6 +2384,7 @@
           <a:p>
             <a:fld id="{9B618960-8005-486C-9A75-10CB2AAC16F9}" type="slidenum">
               <a:rPr lang="en-US" smtClean="0"/>
+              <a:t>‹nº›</a:t>
             </a:fld>
             <a:endParaRPr lang="en-US"/>
           </a:p>
@@ -2415,10 +2446,9 @@
           <a:lstStyle/>
           <a:p>
             <a:r>
-              <a:rPr lang="en-US" smtClean="0"/>
+              <a:rPr lang="en-US"/>
               <a:t>Click to edit Master title style</a:t>
             </a:r>
-            <a:endParaRPr lang="en-US"/>
           </a:p>
         </p:txBody>
       </p:sp>
@@ -2449,42 +2479,37 @@
           <a:p>
             <a:pPr lvl="0"/>
             <a:r>
-              <a:rPr lang="en-US" smtClean="0"/>
+              <a:rPr lang="en-US"/>
               <a:t>Click to edit Master text styles</a:t>
             </a:r>
-            <a:endParaRPr lang="en-US" smtClean="0"/>
           </a:p>
           <a:p>
             <a:pPr lvl="1"/>
             <a:r>
-              <a:rPr lang="en-US" smtClean="0"/>
+              <a:rPr lang="en-US"/>
               <a:t>Second level</a:t>
             </a:r>
-            <a:endParaRPr lang="en-US" smtClean="0"/>
           </a:p>
           <a:p>
             <a:pPr lvl="2"/>
             <a:r>
-              <a:rPr lang="en-US" smtClean="0"/>
+              <a:rPr lang="en-US"/>
               <a:t>Third level</a:t>
             </a:r>
-            <a:endParaRPr lang="en-US" smtClean="0"/>
           </a:p>
           <a:p>
             <a:pPr lvl="3"/>
             <a:r>
-              <a:rPr lang="en-US" smtClean="0"/>
+              <a:rPr lang="en-US"/>
               <a:t>Fourth level</a:t>
             </a:r>
-            <a:endParaRPr lang="en-US" smtClean="0"/>
           </a:p>
           <a:p>
             <a:pPr lvl="4"/>
             <a:r>
-              <a:rPr lang="en-US" smtClean="0"/>
+              <a:rPr lang="en-US"/>
               <a:t>Fifth level</a:t>
             </a:r>
-            <a:endParaRPr lang="en-US"/>
           </a:p>
         </p:txBody>
       </p:sp>
@@ -2523,6 +2548,7 @@
           <a:p>
             <a:fld id="{63A1C593-65D0-4073-BCC9-577B9352EA97}" type="datetimeFigureOut">
               <a:rPr lang="en-US" smtClean="0"/>
+              <a:t>10/25/2020</a:t>
             </a:fld>
             <a:endParaRPr lang="en-US"/>
           </a:p>
@@ -2600,6 +2626,7 @@
           <a:p>
             <a:fld id="{9B618960-8005-486C-9A75-10CB2AAC16F9}" type="slidenum">
               <a:rPr lang="en-US" smtClean="0"/>
+              <a:t>‹nº›</a:t>
             </a:fld>
             <a:endParaRPr lang="en-US"/>
           </a:p>
@@ -2921,62 +2948,30 @@
           <a:chExt cx="0" cy="0"/>
         </a:xfrm>
       </p:grpSpPr>
-      <p:sp>
-        <p:nvSpPr>
-          <p:cNvPr id="2" name="Title 1"/>
-          <p:cNvSpPr>
-            <a:spLocks noGrp="1"/>
-          </p:cNvSpPr>
-          <p:nvPr>
-            <p:ph type="ctrTitle"/>
-          </p:nvPr>
-        </p:nvSpPr>
-        <p:spPr/>
-        <p:txBody>
-          <a:bodyPr/>
-          <a:lstStyle/>
-          <a:p>
-            <a:endParaRPr lang="en-US" dirty="0"/>
-          </a:p>
-        </p:txBody>
-      </p:sp>
-      <p:sp>
-        <p:nvSpPr>
-          <p:cNvPr id="3" name="Subtitle 2"/>
-          <p:cNvSpPr>
-            <a:spLocks noGrp="1"/>
-          </p:cNvSpPr>
-          <p:nvPr>
-            <p:ph type="subTitle" idx="1"/>
-          </p:nvPr>
-        </p:nvSpPr>
-        <p:spPr/>
-        <p:txBody>
-          <a:bodyPr/>
-          <a:lstStyle/>
-          <a:p>
-            <a:endParaRPr lang="en-US"/>
-          </a:p>
-        </p:txBody>
-      </p:sp>
       <p:pic>
         <p:nvPicPr>
-          <p:cNvPr id="6" name="Imagem 5"/>
+          <p:cNvPr id="5" name="Imagem 4">
+            <a:extLst>
+              <a:ext uri="{FF2B5EF4-FFF2-40B4-BE49-F238E27FC236}">
+                <a16:creationId xmlns:a16="http://schemas.microsoft.com/office/drawing/2014/main" id="{C4C1D783-AF30-4A7B-B676-430D5A0ADD63}"/>
+              </a:ext>
+            </a:extLst>
+          </p:cNvPr>
           <p:cNvPicPr>
             <a:picLocks noChangeAspect="1"/>
           </p:cNvPicPr>
           <p:nvPr/>
         </p:nvPicPr>
         <p:blipFill>
-          <a:blip r:embed="rId1"/>
+          <a:blip r:embed="rId2"/>
           <a:stretch>
             <a:fillRect/>
           </a:stretch>
         </p:blipFill>
         <p:spPr>
           <a:xfrm>
-            <a:off x="-47625" y="0"/>
-            <a:ext cx="12292330" cy="6858000"/>
+            <a:off x="1" y="-13395"/>
+            <a:ext cx="12192000" cy="6871395"/>
           </a:xfrm>
           <a:prstGeom prst="rect">
             <a:avLst/>
@@ -2984,6 +2979,11 @@
         </p:spPr>
       </p:pic>
     </p:spTree>
+    <p:extLst>
+      <p:ext uri="{BB962C8B-B14F-4D97-AF65-F5344CB8AC3E}">
+        <p14:creationId xmlns:p14="http://schemas.microsoft.com/office/powerpoint/2010/main" val="2323937444"/>
+      </p:ext>
+    </p:extLst>
   </p:cSld>
   <p:clrMapOvr>
     <a:masterClrMapping/>
@@ -3242,6 +3242,8 @@
       </a:bgFillStyleLst>
     </a:fmtScheme>
   </a:themeElements>
+  <a:objectDefaults/>
+  <a:extraClrSchemeLst/>
   <a:extLst>
     <a:ext uri="{05A4C25C-085E-4340-85A3-A5531E510DB2}">
       <thm15:themeFamily xmlns:thm15="http://schemas.microsoft.com/office/thememl/2012/main" name="Office Theme" id="{62F939B6-93AF-4DB8-9C6B-D6C7DFDC589F}" vid="{4A3C46E8-61CC-4603-A589-7422A47A8E4A}"/>

</xml_diff>